<commit_message>
update for final version
</commit_message>
<xml_diff>
--- a/IML-Praesentation.pptx
+++ b/IML-Praesentation.pptx
@@ -415,7 +415,7 @@
           <a:p>
             <a:fld id="{90BC4B87-6123-4AD5-BA18-D0C615F32DE0}" type="datetimeFigureOut">
               <a:rPr lang="de-DE" smtClean="0"/>
-              <a:t>23.05.18</a:t>
+              <a:t>28.05.18</a:t>
             </a:fld>
             <a:endParaRPr lang="de-DE"/>
           </a:p>
@@ -680,6 +680,108 @@
     </a:lvl9pPr>
   </p:notesStyle>
 </p:notesMaster>
+</file>
+
+<file path=ppt/notesSlides/notesSlide1.xml><?xml version="1.0" encoding="utf-8"?>
+<p:notes xmlns:a="http://schemas.openxmlformats.org/drawingml/2006/main" xmlns:r="http://schemas.openxmlformats.org/officeDocument/2006/relationships" xmlns:p="http://schemas.openxmlformats.org/presentationml/2006/main">
+  <p:cSld>
+    <p:spTree>
+      <p:nvGrpSpPr>
+        <p:cNvPr id="1" name=""/>
+        <p:cNvGrpSpPr/>
+        <p:nvPr/>
+      </p:nvGrpSpPr>
+      <p:grpSpPr>
+        <a:xfrm>
+          <a:off x="0" y="0"/>
+          <a:ext cx="0" cy="0"/>
+          <a:chOff x="0" y="0"/>
+          <a:chExt cx="0" cy="0"/>
+        </a:xfrm>
+      </p:grpSpPr>
+      <p:sp>
+        <p:nvSpPr>
+          <p:cNvPr id="2" name="Slide Image Placeholder 1"/>
+          <p:cNvSpPr>
+            <a:spLocks noGrp="1" noRot="1" noChangeAspect="1"/>
+          </p:cNvSpPr>
+          <p:nvPr>
+            <p:ph type="sldImg"/>
+          </p:nvPr>
+        </p:nvSpPr>
+        <p:spPr/>
+      </p:sp>
+      <p:sp>
+        <p:nvSpPr>
+          <p:cNvPr id="3" name="Notes Placeholder 2"/>
+          <p:cNvSpPr>
+            <a:spLocks noGrp="1"/>
+          </p:cNvSpPr>
+          <p:nvPr>
+            <p:ph type="body" idx="1"/>
+          </p:nvPr>
+        </p:nvSpPr>
+        <p:spPr/>
+        <p:txBody>
+          <a:bodyPr/>
+          <a:lstStyle/>
+          <a:p>
+            <a:r>
+              <a:rPr lang="de-DE" dirty="0"/>
+              <a:t>Training und Evaluation: Kreuzvalidierung und Variation der Parameter</a:t>
+            </a:r>
+          </a:p>
+          <a:p>
+            <a:r>
+              <a:rPr lang="de-DE" dirty="0"/>
+              <a:t>30% Trainingsdaten</a:t>
+            </a:r>
+          </a:p>
+          <a:p>
+            <a:r>
+              <a:rPr lang="de-DE" dirty="0"/>
+              <a:t>70% Testdaten</a:t>
+            </a:r>
+          </a:p>
+          <a:p>
+            <a:endParaRPr lang="de-DE" dirty="0"/>
+          </a:p>
+        </p:txBody>
+      </p:sp>
+      <p:sp>
+        <p:nvSpPr>
+          <p:cNvPr id="4" name="Slide Number Placeholder 3"/>
+          <p:cNvSpPr>
+            <a:spLocks noGrp="1"/>
+          </p:cNvSpPr>
+          <p:nvPr>
+            <p:ph type="sldNum" sz="quarter" idx="10"/>
+          </p:nvPr>
+        </p:nvSpPr>
+        <p:spPr/>
+        <p:txBody>
+          <a:bodyPr/>
+          <a:lstStyle/>
+          <a:p>
+            <a:fld id="{5ED54D14-BD7D-4C86-87A4-3C7AAB60AB5B}" type="slidenum">
+              <a:rPr lang="de-DE" smtClean="0"/>
+              <a:t>12</a:t>
+            </a:fld>
+            <a:endParaRPr lang="de-DE"/>
+          </a:p>
+        </p:txBody>
+      </p:sp>
+    </p:spTree>
+    <p:extLst>
+      <p:ext uri="{BB962C8B-B14F-4D97-AF65-F5344CB8AC3E}">
+        <p14:creationId xmlns:p14="http://schemas.microsoft.com/office/powerpoint/2010/main" val="4243274846"/>
+      </p:ext>
+    </p:extLst>
+  </p:cSld>
+  <p:clrMapOvr>
+    <a:masterClrMapping/>
+  </p:clrMapOvr>
+</p:notes>
 </file>
 
 <file path=ppt/slideLayouts/slideLayout1.xml><?xml version="1.0" encoding="utf-8"?>
@@ -6523,6 +6625,9 @@
           </a:bodyPr>
           <a:lstStyle/>
           <a:p>
+            <a:endParaRPr lang="de-DE" dirty="0"/>
+          </a:p>
+          <a:p>
             <a:r>
               <a:rPr lang="de-DE" dirty="0"/>
               <a:t>zur Veranstaltung „</a:t>
@@ -6551,9 +6656,6 @@
               <a:rPr lang="de-DE" dirty="0"/>
               <a:t> Learning“</a:t>
             </a:r>
-          </a:p>
-          <a:p>
-            <a:endParaRPr lang="de-DE" dirty="0"/>
           </a:p>
           <a:p>
             <a:endParaRPr lang="de-DE" dirty="0"/>
@@ -6889,12 +6991,8 @@
           <a:p>
             <a:pPr marL="446465" lvl="1" indent="-171450"/>
             <a:r>
-              <a:rPr lang="de-DE" dirty="0" err="1"/>
-              <a:t>Bool‘sche</a:t>
-            </a:r>
-            <a:r>
-              <a:rPr lang="de-DE" dirty="0"/>
-              <a:t> Attribute</a:t>
+              <a:rPr lang="de-DE" dirty="0"/>
+              <a:t>Nominale Attribute</a:t>
             </a:r>
           </a:p>
           <a:p>
@@ -7015,6 +7113,395 @@
   <p:clrMapOvr>
     <a:masterClrMapping/>
   </p:clrMapOvr>
+  <p:timing>
+    <p:tnLst>
+      <p:par>
+        <p:cTn id="1" dur="indefinite" restart="never" nodeType="tmRoot">
+          <p:childTnLst>
+            <p:seq concurrent="1" nextAc="seek">
+              <p:cTn id="2" dur="indefinite" nodeType="mainSeq">
+                <p:childTnLst>
+                  <p:par>
+                    <p:cTn id="3" fill="hold">
+                      <p:stCondLst>
+                        <p:cond delay="indefinite"/>
+                      </p:stCondLst>
+                      <p:childTnLst>
+                        <p:par>
+                          <p:cTn id="4" fill="hold">
+                            <p:stCondLst>
+                              <p:cond delay="0"/>
+                            </p:stCondLst>
+                            <p:childTnLst>
+                              <p:par>
+                                <p:cTn id="5" presetID="1" presetClass="entr" presetSubtype="0" fill="hold" nodeType="clickEffect">
+                                  <p:stCondLst>
+                                    <p:cond delay="0"/>
+                                  </p:stCondLst>
+                                  <p:childTnLst>
+                                    <p:set>
+                                      <p:cBhvr>
+                                        <p:cTn id="6" dur="1" fill="hold">
+                                          <p:stCondLst>
+                                            <p:cond delay="0"/>
+                                          </p:stCondLst>
+                                        </p:cTn>
+                                        <p:tgtEl>
+                                          <p:spTgt spid="5">
+                                            <p:txEl>
+                                              <p:pRg st="4" end="4"/>
+                                            </p:txEl>
+                                          </p:spTgt>
+                                        </p:tgtEl>
+                                        <p:attrNameLst>
+                                          <p:attrName>style.visibility</p:attrName>
+                                        </p:attrNameLst>
+                                      </p:cBhvr>
+                                      <p:to>
+                                        <p:strVal val="visible"/>
+                                      </p:to>
+                                    </p:set>
+                                  </p:childTnLst>
+                                </p:cTn>
+                              </p:par>
+                              <p:par>
+                                <p:cTn id="7" presetID="1" presetClass="entr" presetSubtype="0" fill="hold" nodeType="withEffect">
+                                  <p:stCondLst>
+                                    <p:cond delay="0"/>
+                                  </p:stCondLst>
+                                  <p:childTnLst>
+                                    <p:set>
+                                      <p:cBhvr>
+                                        <p:cTn id="8" dur="1" fill="hold">
+                                          <p:stCondLst>
+                                            <p:cond delay="0"/>
+                                          </p:stCondLst>
+                                        </p:cTn>
+                                        <p:tgtEl>
+                                          <p:spTgt spid="5">
+                                            <p:txEl>
+                                              <p:pRg st="5" end="5"/>
+                                            </p:txEl>
+                                          </p:spTgt>
+                                        </p:tgtEl>
+                                        <p:attrNameLst>
+                                          <p:attrName>style.visibility</p:attrName>
+                                        </p:attrNameLst>
+                                      </p:cBhvr>
+                                      <p:to>
+                                        <p:strVal val="visible"/>
+                                      </p:to>
+                                    </p:set>
+                                  </p:childTnLst>
+                                </p:cTn>
+                              </p:par>
+                              <p:par>
+                                <p:cTn id="9" presetID="1" presetClass="entr" presetSubtype="0" fill="hold" nodeType="withEffect">
+                                  <p:stCondLst>
+                                    <p:cond delay="0"/>
+                                  </p:stCondLst>
+                                  <p:childTnLst>
+                                    <p:set>
+                                      <p:cBhvr>
+                                        <p:cTn id="10" dur="1" fill="hold">
+                                          <p:stCondLst>
+                                            <p:cond delay="0"/>
+                                          </p:stCondLst>
+                                        </p:cTn>
+                                        <p:tgtEl>
+                                          <p:spTgt spid="5">
+                                            <p:txEl>
+                                              <p:pRg st="6" end="6"/>
+                                            </p:txEl>
+                                          </p:spTgt>
+                                        </p:tgtEl>
+                                        <p:attrNameLst>
+                                          <p:attrName>style.visibility</p:attrName>
+                                        </p:attrNameLst>
+                                      </p:cBhvr>
+                                      <p:to>
+                                        <p:strVal val="visible"/>
+                                      </p:to>
+                                    </p:set>
+                                  </p:childTnLst>
+                                </p:cTn>
+                              </p:par>
+                              <p:par>
+                                <p:cTn id="11" presetID="1" presetClass="entr" presetSubtype="0" fill="hold" nodeType="withEffect">
+                                  <p:stCondLst>
+                                    <p:cond delay="0"/>
+                                  </p:stCondLst>
+                                  <p:childTnLst>
+                                    <p:set>
+                                      <p:cBhvr>
+                                        <p:cTn id="12" dur="1" fill="hold">
+                                          <p:stCondLst>
+                                            <p:cond delay="0"/>
+                                          </p:stCondLst>
+                                        </p:cTn>
+                                        <p:tgtEl>
+                                          <p:spTgt spid="5">
+                                            <p:txEl>
+                                              <p:pRg st="7" end="7"/>
+                                            </p:txEl>
+                                          </p:spTgt>
+                                        </p:tgtEl>
+                                        <p:attrNameLst>
+                                          <p:attrName>style.visibility</p:attrName>
+                                        </p:attrNameLst>
+                                      </p:cBhvr>
+                                      <p:to>
+                                        <p:strVal val="visible"/>
+                                      </p:to>
+                                    </p:set>
+                                  </p:childTnLst>
+                                </p:cTn>
+                              </p:par>
+                              <p:par>
+                                <p:cTn id="13" presetID="1" presetClass="entr" presetSubtype="0" fill="hold" nodeType="withEffect">
+                                  <p:stCondLst>
+                                    <p:cond delay="0"/>
+                                  </p:stCondLst>
+                                  <p:childTnLst>
+                                    <p:set>
+                                      <p:cBhvr>
+                                        <p:cTn id="14" dur="1" fill="hold">
+                                          <p:stCondLst>
+                                            <p:cond delay="0"/>
+                                          </p:stCondLst>
+                                        </p:cTn>
+                                        <p:tgtEl>
+                                          <p:spTgt spid="5">
+                                            <p:txEl>
+                                              <p:pRg st="9" end="9"/>
+                                            </p:txEl>
+                                          </p:spTgt>
+                                        </p:tgtEl>
+                                        <p:attrNameLst>
+                                          <p:attrName>style.visibility</p:attrName>
+                                        </p:attrNameLst>
+                                      </p:cBhvr>
+                                      <p:to>
+                                        <p:strVal val="visible"/>
+                                      </p:to>
+                                    </p:set>
+                                  </p:childTnLst>
+                                </p:cTn>
+                              </p:par>
+                              <p:par>
+                                <p:cTn id="15" presetID="1" presetClass="entr" presetSubtype="0" fill="hold" nodeType="withEffect">
+                                  <p:stCondLst>
+                                    <p:cond delay="0"/>
+                                  </p:stCondLst>
+                                  <p:childTnLst>
+                                    <p:set>
+                                      <p:cBhvr>
+                                        <p:cTn id="16" dur="1" fill="hold">
+                                          <p:stCondLst>
+                                            <p:cond delay="0"/>
+                                          </p:stCondLst>
+                                        </p:cTn>
+                                        <p:tgtEl>
+                                          <p:spTgt spid="5">
+                                            <p:txEl>
+                                              <p:pRg st="10" end="10"/>
+                                            </p:txEl>
+                                          </p:spTgt>
+                                        </p:tgtEl>
+                                        <p:attrNameLst>
+                                          <p:attrName>style.visibility</p:attrName>
+                                        </p:attrNameLst>
+                                      </p:cBhvr>
+                                      <p:to>
+                                        <p:strVal val="visible"/>
+                                      </p:to>
+                                    </p:set>
+                                  </p:childTnLst>
+                                </p:cTn>
+                              </p:par>
+                              <p:par>
+                                <p:cTn id="17" presetID="1" presetClass="entr" presetSubtype="0" fill="hold" nodeType="withEffect">
+                                  <p:stCondLst>
+                                    <p:cond delay="0"/>
+                                  </p:stCondLst>
+                                  <p:childTnLst>
+                                    <p:set>
+                                      <p:cBhvr>
+                                        <p:cTn id="18" dur="1" fill="hold">
+                                          <p:stCondLst>
+                                            <p:cond delay="0"/>
+                                          </p:stCondLst>
+                                        </p:cTn>
+                                        <p:tgtEl>
+                                          <p:spTgt spid="5">
+                                            <p:txEl>
+                                              <p:pRg st="11" end="11"/>
+                                            </p:txEl>
+                                          </p:spTgt>
+                                        </p:tgtEl>
+                                        <p:attrNameLst>
+                                          <p:attrName>style.visibility</p:attrName>
+                                        </p:attrNameLst>
+                                      </p:cBhvr>
+                                      <p:to>
+                                        <p:strVal val="visible"/>
+                                      </p:to>
+                                    </p:set>
+                                  </p:childTnLst>
+                                </p:cTn>
+                              </p:par>
+                              <p:par>
+                                <p:cTn id="19" presetID="1" presetClass="entr" presetSubtype="0" fill="hold" nodeType="withEffect">
+                                  <p:stCondLst>
+                                    <p:cond delay="0"/>
+                                  </p:stCondLst>
+                                  <p:childTnLst>
+                                    <p:set>
+                                      <p:cBhvr>
+                                        <p:cTn id="20" dur="1" fill="hold">
+                                          <p:stCondLst>
+                                            <p:cond delay="0"/>
+                                          </p:stCondLst>
+                                        </p:cTn>
+                                        <p:tgtEl>
+                                          <p:spTgt spid="5">
+                                            <p:txEl>
+                                              <p:pRg st="12" end="12"/>
+                                            </p:txEl>
+                                          </p:spTgt>
+                                        </p:tgtEl>
+                                        <p:attrNameLst>
+                                          <p:attrName>style.visibility</p:attrName>
+                                        </p:attrNameLst>
+                                      </p:cBhvr>
+                                      <p:to>
+                                        <p:strVal val="visible"/>
+                                      </p:to>
+                                    </p:set>
+                                  </p:childTnLst>
+                                </p:cTn>
+                              </p:par>
+                              <p:par>
+                                <p:cTn id="21" presetID="1" presetClass="entr" presetSubtype="0" fill="hold" nodeType="withEffect">
+                                  <p:stCondLst>
+                                    <p:cond delay="0"/>
+                                  </p:stCondLst>
+                                  <p:childTnLst>
+                                    <p:set>
+                                      <p:cBhvr>
+                                        <p:cTn id="22" dur="1" fill="hold">
+                                          <p:stCondLst>
+                                            <p:cond delay="0"/>
+                                          </p:stCondLst>
+                                        </p:cTn>
+                                        <p:tgtEl>
+                                          <p:spTgt spid="5">
+                                            <p:txEl>
+                                              <p:pRg st="14" end="14"/>
+                                            </p:txEl>
+                                          </p:spTgt>
+                                        </p:tgtEl>
+                                        <p:attrNameLst>
+                                          <p:attrName>style.visibility</p:attrName>
+                                        </p:attrNameLst>
+                                      </p:cBhvr>
+                                      <p:to>
+                                        <p:strVal val="visible"/>
+                                      </p:to>
+                                    </p:set>
+                                  </p:childTnLst>
+                                </p:cTn>
+                              </p:par>
+                              <p:par>
+                                <p:cTn id="23" presetID="1" presetClass="entr" presetSubtype="0" fill="hold" nodeType="withEffect">
+                                  <p:stCondLst>
+                                    <p:cond delay="0"/>
+                                  </p:stCondLst>
+                                  <p:childTnLst>
+                                    <p:set>
+                                      <p:cBhvr>
+                                        <p:cTn id="24" dur="1" fill="hold">
+                                          <p:stCondLst>
+                                            <p:cond delay="0"/>
+                                          </p:stCondLst>
+                                        </p:cTn>
+                                        <p:tgtEl>
+                                          <p:spTgt spid="5">
+                                            <p:txEl>
+                                              <p:pRg st="15" end="15"/>
+                                            </p:txEl>
+                                          </p:spTgt>
+                                        </p:tgtEl>
+                                        <p:attrNameLst>
+                                          <p:attrName>style.visibility</p:attrName>
+                                        </p:attrNameLst>
+                                      </p:cBhvr>
+                                      <p:to>
+                                        <p:strVal val="visible"/>
+                                      </p:to>
+                                    </p:set>
+                                  </p:childTnLst>
+                                </p:cTn>
+                              </p:par>
+                              <p:par>
+                                <p:cTn id="25" presetID="1" presetClass="entr" presetSubtype="0" fill="hold" nodeType="withEffect">
+                                  <p:stCondLst>
+                                    <p:cond delay="0"/>
+                                  </p:stCondLst>
+                                  <p:childTnLst>
+                                    <p:set>
+                                      <p:cBhvr>
+                                        <p:cTn id="26" dur="1" fill="hold">
+                                          <p:stCondLst>
+                                            <p:cond delay="0"/>
+                                          </p:stCondLst>
+                                        </p:cTn>
+                                        <p:tgtEl>
+                                          <p:spTgt spid="5">
+                                            <p:txEl>
+                                              <p:pRg st="16" end="16"/>
+                                            </p:txEl>
+                                          </p:spTgt>
+                                        </p:tgtEl>
+                                        <p:attrNameLst>
+                                          <p:attrName>style.visibility</p:attrName>
+                                        </p:attrNameLst>
+                                      </p:cBhvr>
+                                      <p:to>
+                                        <p:strVal val="visible"/>
+                                      </p:to>
+                                    </p:set>
+                                  </p:childTnLst>
+                                </p:cTn>
+                              </p:par>
+                            </p:childTnLst>
+                          </p:cTn>
+                        </p:par>
+                      </p:childTnLst>
+                    </p:cTn>
+                  </p:par>
+                </p:childTnLst>
+              </p:cTn>
+              <p:prevCondLst>
+                <p:cond evt="onPrev" delay="0">
+                  <p:tgtEl>
+                    <p:sldTgt/>
+                  </p:tgtEl>
+                </p:cond>
+              </p:prevCondLst>
+              <p:nextCondLst>
+                <p:cond evt="onNext" delay="0">
+                  <p:tgtEl>
+                    <p:sldTgt/>
+                  </p:tgtEl>
+                </p:cond>
+              </p:nextCondLst>
+            </p:seq>
+          </p:childTnLst>
+        </p:cTn>
+      </p:par>
+    </p:tnLst>
+  </p:timing>
 </p:sld>
 </file>
 
@@ -7846,21 +8333,14 @@
             </a:pPr>
             <a:r>
               <a:rPr lang="de-DE" dirty="0"/>
-              <a:t>Parameter:</a:t>
+              <a:t>Definierte Parameter:</a:t>
             </a:r>
           </a:p>
           <a:p>
             <a:pPr marL="503615" lvl="1" indent="-228600"/>
             <a:r>
               <a:rPr lang="de-DE" dirty="0"/>
-              <a:t>Maximale Anzahl der Blätter </a:t>
-            </a:r>
-            <a:br>
-              <a:rPr lang="de-DE" dirty="0"/>
-            </a:br>
-            <a:r>
-              <a:rPr lang="de-DE" dirty="0"/>
-              <a:t>= (Anzahl Merkmale – 1)</a:t>
+              <a:t>Maximale Tiefe = [ Anzahl Merkmale – 1 ]</a:t>
             </a:r>
           </a:p>
         </p:txBody>
@@ -7958,7 +8438,7 @@
         </p:blipFill>
         <p:spPr>
           <a:xfrm>
-            <a:off x="3470151" y="2355726"/>
+            <a:off x="3717032" y="2355726"/>
             <a:ext cx="2705100" cy="1981200"/>
           </a:xfrm>
           <a:prstGeom prst="rect">
@@ -8166,7 +8646,11 @@
             </a:pPr>
             <a:r>
               <a:rPr lang="de-DE" dirty="0"/>
-              <a:t>Parameterwahl C</a:t>
+              <a:t>Parameterwahl </a:t>
+            </a:r>
+            <a:r>
+              <a:rPr lang="de-DE" i="1" dirty="0"/>
+              <a:t>C = 1</a:t>
             </a:r>
           </a:p>
           <a:p>
@@ -8478,16 +8962,25 @@
             </a:pPr>
             <a:r>
               <a:rPr lang="de-DE" dirty="0"/>
-              <a:t>Parameterwahl C und </a:t>
-            </a:r>
-            <a:r>
-              <a:rPr lang="el-GR" dirty="0"/>
-              <a:t>γ</a:t>
+              <a:t>Parameterwahl </a:t>
+            </a:r>
+            <a:r>
+              <a:rPr lang="de-DE" i="1" dirty="0"/>
+              <a:t>C = 1</a:t>
+            </a:r>
+            <a:r>
+              <a:rPr lang="de-DE" dirty="0"/>
+              <a:t> und </a:t>
             </a:r>
             <a:r>
               <a:rPr lang="el-GR" i="1" dirty="0"/>
-              <a:t> </a:t>
-            </a:r>
+              <a:t>γ </a:t>
+            </a:r>
+            <a:r>
+              <a:rPr lang="de-DE" i="1" dirty="0"/>
+              <a:t>= 0.095</a:t>
+            </a:r>
+            <a:endParaRPr lang="el-GR" i="1" dirty="0"/>
           </a:p>
           <a:p>
             <a:pPr marL="228600" indent="-228600">
@@ -9231,7 +9724,7 @@
             </a:pPr>
             <a:r>
               <a:rPr lang="de-DE" dirty="0"/>
-              <a:t>Bietet im Rahmen der Arbeit das schlechteste Ergebnis (Trennschärfe ~ 90%)</a:t>
+              <a:t>Bietet im Rahmen der Arbeit das schlechteste Ergebnis</a:t>
             </a:r>
           </a:p>
         </p:txBody>
@@ -11132,7 +11625,7 @@
         <p:spPr/>
         <p:txBody>
           <a:bodyPr>
-            <a:normAutofit fontScale="92500"/>
+            <a:normAutofit fontScale="92500" lnSpcReduction="10000"/>
           </a:bodyPr>
           <a:lstStyle/>
           <a:p>
@@ -11233,6 +11726,21 @@
             <a:r>
               <a:rPr lang="de-DE" dirty="0"/>
               <a:t> (Kernel Linear / RBF)</a:t>
+            </a:r>
+          </a:p>
+          <a:p>
+            <a:pPr marL="503615" lvl="1" indent="-228600"/>
+            <a:r>
+              <a:rPr lang="de-DE" dirty="0"/>
+              <a:t>Entscheidungsbaum (bei der Verwendung des Attributes </a:t>
+            </a:r>
+            <a:r>
+              <a:rPr lang="de-DE" i="1" dirty="0" err="1"/>
+              <a:t>result</a:t>
+            </a:r>
+            <a:r>
+              <a:rPr lang="de-DE" dirty="0"/>
+              <a:t>)</a:t>
             </a:r>
           </a:p>
           <a:p>
@@ -13708,8 +14216,13 @@
           <a:p>
             <a:r>
               <a:rPr lang="de-DE" dirty="0"/>
-              <a:t>Datenanalyse</a:t>
-            </a:r>
+              <a:t>Datenanalyse – Verteilung des Attributes </a:t>
+            </a:r>
+            <a:r>
+              <a:rPr lang="de-DE" i="1" dirty="0" err="1"/>
+              <a:t>result</a:t>
+            </a:r>
+            <a:endParaRPr lang="de-DE" dirty="0"/>
           </a:p>
         </p:txBody>
       </p:sp>

</xml_diff>